<commit_message>
update raster_option.py, supplied an example raster_dataframe
</commit_message>
<xml_diff>
--- a/Win10_install_combinato.pptx
+++ b/Win10_install_combinato.pptx
@@ -133,84 +133,6 @@
 
 <file path=ppt/changesInfos/changesInfo1.xml><?xml version="1.0" encoding="utf-8"?>
 <pc:chgInfo xmlns:a="http://schemas.openxmlformats.org/drawingml/2006/main" xmlns:r="http://schemas.openxmlformats.org/officeDocument/2006/relationships" xmlns:ac="http://schemas.microsoft.com/office/drawing/2013/main/command" xmlns:pc="http://schemas.microsoft.com/office/powerpoint/2013/main/command">
-  <pc:docChgLst>
-    <pc:chgData name="Liang, Mingli" userId="aa9d3a45-4ecd-477e-91f3-db58cc3a88ab" providerId="ADAL" clId="{BAAFFC72-756C-4785-84AB-BB183E3344F5}"/>
-    <pc:docChg chg="undo custSel addSld modSld">
-      <pc:chgData name="Liang, Mingli" userId="aa9d3a45-4ecd-477e-91f3-db58cc3a88ab" providerId="ADAL" clId="{BAAFFC72-756C-4785-84AB-BB183E3344F5}" dt="2022-06-10T18:16:51.141" v="59" actId="20577"/>
-      <pc:docMkLst>
-        <pc:docMk/>
-      </pc:docMkLst>
-      <pc:sldChg chg="modSp mod">
-        <pc:chgData name="Liang, Mingli" userId="aa9d3a45-4ecd-477e-91f3-db58cc3a88ab" providerId="ADAL" clId="{BAAFFC72-756C-4785-84AB-BB183E3344F5}" dt="2022-06-09T17:40:56.244" v="4"/>
-        <pc:sldMkLst>
-          <pc:docMk/>
-          <pc:sldMk cId="3605041188" sldId="260"/>
-        </pc:sldMkLst>
-        <pc:spChg chg="mod">
-          <ac:chgData name="Liang, Mingli" userId="aa9d3a45-4ecd-477e-91f3-db58cc3a88ab" providerId="ADAL" clId="{BAAFFC72-756C-4785-84AB-BB183E3344F5}" dt="2022-06-09T17:40:56.244" v="4"/>
-          <ac:spMkLst>
-            <pc:docMk/>
-            <pc:sldMk cId="3605041188" sldId="260"/>
-            <ac:spMk id="3" creationId="{86710A47-81B9-4024-A273-8935169A0C2B}"/>
-          </ac:spMkLst>
-        </pc:spChg>
-      </pc:sldChg>
-      <pc:sldChg chg="addSp delSp modSp mod">
-        <pc:chgData name="Liang, Mingli" userId="aa9d3a45-4ecd-477e-91f3-db58cc3a88ab" providerId="ADAL" clId="{BAAFFC72-756C-4785-84AB-BB183E3344F5}" dt="2022-06-10T18:16:51.141" v="59" actId="20577"/>
-        <pc:sldMkLst>
-          <pc:docMk/>
-          <pc:sldMk cId="1897962578" sldId="261"/>
-        </pc:sldMkLst>
-        <pc:spChg chg="mod">
-          <ac:chgData name="Liang, Mingli" userId="aa9d3a45-4ecd-477e-91f3-db58cc3a88ab" providerId="ADAL" clId="{BAAFFC72-756C-4785-84AB-BB183E3344F5}" dt="2022-06-10T18:16:51.141" v="59" actId="20577"/>
-          <ac:spMkLst>
-            <pc:docMk/>
-            <pc:sldMk cId="1897962578" sldId="261"/>
-            <ac:spMk id="3" creationId="{76D0134B-E307-4B97-AD60-9A7143881CA0}"/>
-          </ac:spMkLst>
-        </pc:spChg>
-        <pc:spChg chg="add del">
-          <ac:chgData name="Liang, Mingli" userId="aa9d3a45-4ecd-477e-91f3-db58cc3a88ab" providerId="ADAL" clId="{BAAFFC72-756C-4785-84AB-BB183E3344F5}" dt="2022-06-09T17:41:18.521" v="31"/>
-          <ac:spMkLst>
-            <pc:docMk/>
-            <pc:sldMk cId="1897962578" sldId="261"/>
-            <ac:spMk id="4" creationId="{A0CA804D-275B-4A09-9A33-285C8EA173D4}"/>
-          </ac:spMkLst>
-        </pc:spChg>
-      </pc:sldChg>
-      <pc:sldChg chg="addSp delSp modSp new mod">
-        <pc:chgData name="Liang, Mingli" userId="aa9d3a45-4ecd-477e-91f3-db58cc3a88ab" providerId="ADAL" clId="{BAAFFC72-756C-4785-84AB-BB183E3344F5}" dt="2022-06-09T17:54:09.378" v="58"/>
-        <pc:sldMkLst>
-          <pc:docMk/>
-          <pc:sldMk cId="1971509557" sldId="262"/>
-        </pc:sldMkLst>
-        <pc:spChg chg="mod">
-          <ac:chgData name="Liang, Mingli" userId="aa9d3a45-4ecd-477e-91f3-db58cc3a88ab" providerId="ADAL" clId="{BAAFFC72-756C-4785-84AB-BB183E3344F5}" dt="2022-06-09T17:54:05.908" v="54" actId="20577"/>
-          <ac:spMkLst>
-            <pc:docMk/>
-            <pc:sldMk cId="1971509557" sldId="262"/>
-            <ac:spMk id="2" creationId="{12981273-AACF-4D3D-A67D-3F519E8F4147}"/>
-          </ac:spMkLst>
-        </pc:spChg>
-        <pc:spChg chg="add del mod">
-          <ac:chgData name="Liang, Mingli" userId="aa9d3a45-4ecd-477e-91f3-db58cc3a88ab" providerId="ADAL" clId="{BAAFFC72-756C-4785-84AB-BB183E3344F5}" dt="2022-06-09T17:54:09.378" v="58"/>
-          <ac:spMkLst>
-            <pc:docMk/>
-            <pc:sldMk cId="1971509557" sldId="262"/>
-            <ac:spMk id="3" creationId="{39222FE5-F9F1-41F1-ABD7-9D403B0DE3D4}"/>
-          </ac:spMkLst>
-        </pc:spChg>
-        <pc:spChg chg="add del mod">
-          <ac:chgData name="Liang, Mingli" userId="aa9d3a45-4ecd-477e-91f3-db58cc3a88ab" providerId="ADAL" clId="{BAAFFC72-756C-4785-84AB-BB183E3344F5}" dt="2022-06-09T17:54:09.347" v="56"/>
-          <ac:spMkLst>
-            <pc:docMk/>
-            <pc:sldMk cId="1971509557" sldId="262"/>
-            <ac:spMk id="4" creationId="{15E8E811-989F-460E-921C-E876A56001C7}"/>
-          </ac:spMkLst>
-        </pc:spChg>
-      </pc:sldChg>
-    </pc:docChg>
-  </pc:docChgLst>
   <pc:docChgLst>
     <pc:chgData name="Liang, Mingli" userId="aa9d3a45-4ecd-477e-91f3-db58cc3a88ab" providerId="ADAL" clId="{D52D8EC0-1EFB-49EE-A7FD-D823B94A4F10}"/>
     <pc:docChg chg="undo custSel addSld delSld modSld">
@@ -831,6 +753,84 @@
       </pc:sldChg>
     </pc:docChg>
   </pc:docChgLst>
+  <pc:docChgLst>
+    <pc:chgData name="Liang, Mingli" userId="aa9d3a45-4ecd-477e-91f3-db58cc3a88ab" providerId="ADAL" clId="{BAAFFC72-756C-4785-84AB-BB183E3344F5}"/>
+    <pc:docChg chg="undo custSel addSld modSld">
+      <pc:chgData name="Liang, Mingli" userId="aa9d3a45-4ecd-477e-91f3-db58cc3a88ab" providerId="ADAL" clId="{BAAFFC72-756C-4785-84AB-BB183E3344F5}" dt="2022-06-10T18:16:51.141" v="59" actId="20577"/>
+      <pc:docMkLst>
+        <pc:docMk/>
+      </pc:docMkLst>
+      <pc:sldChg chg="modSp mod">
+        <pc:chgData name="Liang, Mingli" userId="aa9d3a45-4ecd-477e-91f3-db58cc3a88ab" providerId="ADAL" clId="{BAAFFC72-756C-4785-84AB-BB183E3344F5}" dt="2022-06-09T17:40:56.244" v="4"/>
+        <pc:sldMkLst>
+          <pc:docMk/>
+          <pc:sldMk cId="3605041188" sldId="260"/>
+        </pc:sldMkLst>
+        <pc:spChg chg="mod">
+          <ac:chgData name="Liang, Mingli" userId="aa9d3a45-4ecd-477e-91f3-db58cc3a88ab" providerId="ADAL" clId="{BAAFFC72-756C-4785-84AB-BB183E3344F5}" dt="2022-06-09T17:40:56.244" v="4"/>
+          <ac:spMkLst>
+            <pc:docMk/>
+            <pc:sldMk cId="3605041188" sldId="260"/>
+            <ac:spMk id="3" creationId="{86710A47-81B9-4024-A273-8935169A0C2B}"/>
+          </ac:spMkLst>
+        </pc:spChg>
+      </pc:sldChg>
+      <pc:sldChg chg="addSp delSp modSp mod">
+        <pc:chgData name="Liang, Mingli" userId="aa9d3a45-4ecd-477e-91f3-db58cc3a88ab" providerId="ADAL" clId="{BAAFFC72-756C-4785-84AB-BB183E3344F5}" dt="2022-06-10T18:16:51.141" v="59" actId="20577"/>
+        <pc:sldMkLst>
+          <pc:docMk/>
+          <pc:sldMk cId="1897962578" sldId="261"/>
+        </pc:sldMkLst>
+        <pc:spChg chg="mod">
+          <ac:chgData name="Liang, Mingli" userId="aa9d3a45-4ecd-477e-91f3-db58cc3a88ab" providerId="ADAL" clId="{BAAFFC72-756C-4785-84AB-BB183E3344F5}" dt="2022-06-10T18:16:51.141" v="59" actId="20577"/>
+          <ac:spMkLst>
+            <pc:docMk/>
+            <pc:sldMk cId="1897962578" sldId="261"/>
+            <ac:spMk id="3" creationId="{76D0134B-E307-4B97-AD60-9A7143881CA0}"/>
+          </ac:spMkLst>
+        </pc:spChg>
+        <pc:spChg chg="add del">
+          <ac:chgData name="Liang, Mingli" userId="aa9d3a45-4ecd-477e-91f3-db58cc3a88ab" providerId="ADAL" clId="{BAAFFC72-756C-4785-84AB-BB183E3344F5}" dt="2022-06-09T17:41:18.521" v="31"/>
+          <ac:spMkLst>
+            <pc:docMk/>
+            <pc:sldMk cId="1897962578" sldId="261"/>
+            <ac:spMk id="4" creationId="{A0CA804D-275B-4A09-9A33-285C8EA173D4}"/>
+          </ac:spMkLst>
+        </pc:spChg>
+      </pc:sldChg>
+      <pc:sldChg chg="addSp delSp modSp new mod">
+        <pc:chgData name="Liang, Mingli" userId="aa9d3a45-4ecd-477e-91f3-db58cc3a88ab" providerId="ADAL" clId="{BAAFFC72-756C-4785-84AB-BB183E3344F5}" dt="2022-06-09T17:54:09.378" v="58"/>
+        <pc:sldMkLst>
+          <pc:docMk/>
+          <pc:sldMk cId="1971509557" sldId="262"/>
+        </pc:sldMkLst>
+        <pc:spChg chg="mod">
+          <ac:chgData name="Liang, Mingli" userId="aa9d3a45-4ecd-477e-91f3-db58cc3a88ab" providerId="ADAL" clId="{BAAFFC72-756C-4785-84AB-BB183E3344F5}" dt="2022-06-09T17:54:05.908" v="54" actId="20577"/>
+          <ac:spMkLst>
+            <pc:docMk/>
+            <pc:sldMk cId="1971509557" sldId="262"/>
+            <ac:spMk id="2" creationId="{12981273-AACF-4D3D-A67D-3F519E8F4147}"/>
+          </ac:spMkLst>
+        </pc:spChg>
+        <pc:spChg chg="add del mod">
+          <ac:chgData name="Liang, Mingli" userId="aa9d3a45-4ecd-477e-91f3-db58cc3a88ab" providerId="ADAL" clId="{BAAFFC72-756C-4785-84AB-BB183E3344F5}" dt="2022-06-09T17:54:09.378" v="58"/>
+          <ac:spMkLst>
+            <pc:docMk/>
+            <pc:sldMk cId="1971509557" sldId="262"/>
+            <ac:spMk id="3" creationId="{39222FE5-F9F1-41F1-ABD7-9D403B0DE3D4}"/>
+          </ac:spMkLst>
+        </pc:spChg>
+        <pc:spChg chg="add del mod">
+          <ac:chgData name="Liang, Mingli" userId="aa9d3a45-4ecd-477e-91f3-db58cc3a88ab" providerId="ADAL" clId="{BAAFFC72-756C-4785-84AB-BB183E3344F5}" dt="2022-06-09T17:54:09.347" v="56"/>
+          <ac:spMkLst>
+            <pc:docMk/>
+            <pc:sldMk cId="1971509557" sldId="262"/>
+            <ac:spMk id="4" creationId="{15E8E811-989F-460E-921C-E876A56001C7}"/>
+          </ac:spMkLst>
+        </pc:spChg>
+      </pc:sldChg>
+    </pc:docChg>
+  </pc:docChgLst>
 </pc:chgInfo>
 </file>
 
@@ -981,7 +981,7 @@
           <a:p>
             <a:fld id="{6C792A13-F6F3-43BC-853F-11696B7B252D}" type="datetimeFigureOut">
               <a:rPr lang="en-US" smtClean="0"/>
-              <a:t>7/12/2022</a:t>
+              <a:t>8/25/2022</a:t>
             </a:fld>
             <a:endParaRPr lang="en-US"/>
           </a:p>
@@ -1179,7 +1179,7 @@
           <a:p>
             <a:fld id="{6C792A13-F6F3-43BC-853F-11696B7B252D}" type="datetimeFigureOut">
               <a:rPr lang="en-US" smtClean="0"/>
-              <a:t>7/12/2022</a:t>
+              <a:t>8/25/2022</a:t>
             </a:fld>
             <a:endParaRPr lang="en-US"/>
           </a:p>
@@ -1387,7 +1387,7 @@
           <a:p>
             <a:fld id="{6C792A13-F6F3-43BC-853F-11696B7B252D}" type="datetimeFigureOut">
               <a:rPr lang="en-US" smtClean="0"/>
-              <a:t>7/12/2022</a:t>
+              <a:t>8/25/2022</a:t>
             </a:fld>
             <a:endParaRPr lang="en-US"/>
           </a:p>
@@ -1585,7 +1585,7 @@
           <a:p>
             <a:fld id="{6C792A13-F6F3-43BC-853F-11696B7B252D}" type="datetimeFigureOut">
               <a:rPr lang="en-US" smtClean="0"/>
-              <a:t>7/12/2022</a:t>
+              <a:t>8/25/2022</a:t>
             </a:fld>
             <a:endParaRPr lang="en-US"/>
           </a:p>
@@ -1860,7 +1860,7 @@
           <a:p>
             <a:fld id="{6C792A13-F6F3-43BC-853F-11696B7B252D}" type="datetimeFigureOut">
               <a:rPr lang="en-US" smtClean="0"/>
-              <a:t>7/12/2022</a:t>
+              <a:t>8/25/2022</a:t>
             </a:fld>
             <a:endParaRPr lang="en-US"/>
           </a:p>
@@ -2125,7 +2125,7 @@
           <a:p>
             <a:fld id="{6C792A13-F6F3-43BC-853F-11696B7B252D}" type="datetimeFigureOut">
               <a:rPr lang="en-US" smtClean="0"/>
-              <a:t>7/12/2022</a:t>
+              <a:t>8/25/2022</a:t>
             </a:fld>
             <a:endParaRPr lang="en-US"/>
           </a:p>
@@ -2537,7 +2537,7 @@
           <a:p>
             <a:fld id="{6C792A13-F6F3-43BC-853F-11696B7B252D}" type="datetimeFigureOut">
               <a:rPr lang="en-US" smtClean="0"/>
-              <a:t>7/12/2022</a:t>
+              <a:t>8/25/2022</a:t>
             </a:fld>
             <a:endParaRPr lang="en-US"/>
           </a:p>
@@ -2678,7 +2678,7 @@
           <a:p>
             <a:fld id="{6C792A13-F6F3-43BC-853F-11696B7B252D}" type="datetimeFigureOut">
               <a:rPr lang="en-US" smtClean="0"/>
-              <a:t>7/12/2022</a:t>
+              <a:t>8/25/2022</a:t>
             </a:fld>
             <a:endParaRPr lang="en-US"/>
           </a:p>
@@ -2791,7 +2791,7 @@
           <a:p>
             <a:fld id="{6C792A13-F6F3-43BC-853F-11696B7B252D}" type="datetimeFigureOut">
               <a:rPr lang="en-US" smtClean="0"/>
-              <a:t>7/12/2022</a:t>
+              <a:t>8/25/2022</a:t>
             </a:fld>
             <a:endParaRPr lang="en-US"/>
           </a:p>
@@ -3102,7 +3102,7 @@
           <a:p>
             <a:fld id="{6C792A13-F6F3-43BC-853F-11696B7B252D}" type="datetimeFigureOut">
               <a:rPr lang="en-US" smtClean="0"/>
-              <a:t>7/12/2022</a:t>
+              <a:t>8/25/2022</a:t>
             </a:fld>
             <a:endParaRPr lang="en-US"/>
           </a:p>
@@ -3390,7 +3390,7 @@
           <a:p>
             <a:fld id="{6C792A13-F6F3-43BC-853F-11696B7B252D}" type="datetimeFigureOut">
               <a:rPr lang="en-US" smtClean="0"/>
-              <a:t>7/12/2022</a:t>
+              <a:t>8/25/2022</a:t>
             </a:fld>
             <a:endParaRPr lang="en-US"/>
           </a:p>
@@ -3631,7 +3631,7 @@
           <a:p>
             <a:fld id="{6C792A13-F6F3-43BC-853F-11696B7B252D}" type="datetimeFigureOut">
               <a:rPr lang="en-US" smtClean="0"/>
-              <a:t>7/12/2022</a:t>
+              <a:t>8/25/2022</a:t>
             </a:fld>
             <a:endParaRPr lang="en-US"/>
           </a:p>
@@ -4113,7 +4113,17 @@
           <a:p>
             <a:r>
               <a:rPr lang="en-US" dirty="0"/>
-              <a:t>June 27 2022</a:t>
+              <a:t>Brett Gu</a:t>
+            </a:r>
+          </a:p>
+          <a:p>
+            <a:r>
+              <a:rPr lang="en-US"/>
+              <a:t>Aug 25 </a:t>
+            </a:r>
+            <a:r>
+              <a:rPr lang="en-US" dirty="0"/>
+              <a:t>2022</a:t>
             </a:r>
           </a:p>
         </p:txBody>

</xml_diff>